<commit_message>
Map 5 and 6 (Crossroads)
</commit_message>
<xml_diff>
--- a/Assets/Etc/Textures.pptx
+++ b/Assets/Etc/Textures.pptx
@@ -6,6 +6,7 @@
   </p:sldMasterIdLst>
   <p:sldIdLst>
     <p:sldId id="256" r:id="rId2"/>
+    <p:sldId id="257" r:id="rId3"/>
   </p:sldIdLst>
   <p:sldSz cx="12192000" cy="6858000"/>
   <p:notesSz cx="6858000" cy="9144000"/>
@@ -104,6 +105,11 @@
       </a:defRPr>
     </a:lvl9pPr>
   </p:defaultTextStyle>
+  <p:extLst>
+    <p:ext uri="{EFAFB233-063F-42B5-8137-9DF3F51BA10A}">
+      <p15:sldGuideLst xmlns:p15="http://schemas.microsoft.com/office/powerpoint/2012/main"/>
+    </p:ext>
+  </p:extLst>
 </p:presentation>
 </file>
 
@@ -256,7 +262,7 @@
           <a:p>
             <a:fld id="{6524AA6A-33AF-41C8-84C7-4073CA180999}" type="datetimeFigureOut">
               <a:rPr lang="en-US" smtClean="0"/>
-              <a:t>7/13/2021</a:t>
+              <a:t>7/19/2021</a:t>
             </a:fld>
             <a:endParaRPr lang="en-US"/>
           </a:p>
@@ -456,7 +462,7 @@
           <a:p>
             <a:fld id="{6524AA6A-33AF-41C8-84C7-4073CA180999}" type="datetimeFigureOut">
               <a:rPr lang="en-US" smtClean="0"/>
-              <a:t>7/13/2021</a:t>
+              <a:t>7/19/2021</a:t>
             </a:fld>
             <a:endParaRPr lang="en-US"/>
           </a:p>
@@ -666,7 +672,7 @@
           <a:p>
             <a:fld id="{6524AA6A-33AF-41C8-84C7-4073CA180999}" type="datetimeFigureOut">
               <a:rPr lang="en-US" smtClean="0"/>
-              <a:t>7/13/2021</a:t>
+              <a:t>7/19/2021</a:t>
             </a:fld>
             <a:endParaRPr lang="en-US"/>
           </a:p>
@@ -866,7 +872,7 @@
           <a:p>
             <a:fld id="{6524AA6A-33AF-41C8-84C7-4073CA180999}" type="datetimeFigureOut">
               <a:rPr lang="en-US" smtClean="0"/>
-              <a:t>7/13/2021</a:t>
+              <a:t>7/19/2021</a:t>
             </a:fld>
             <a:endParaRPr lang="en-US"/>
           </a:p>
@@ -1142,7 +1148,7 @@
           <a:p>
             <a:fld id="{6524AA6A-33AF-41C8-84C7-4073CA180999}" type="datetimeFigureOut">
               <a:rPr lang="en-US" smtClean="0"/>
-              <a:t>7/13/2021</a:t>
+              <a:t>7/19/2021</a:t>
             </a:fld>
             <a:endParaRPr lang="en-US"/>
           </a:p>
@@ -1410,7 +1416,7 @@
           <a:p>
             <a:fld id="{6524AA6A-33AF-41C8-84C7-4073CA180999}" type="datetimeFigureOut">
               <a:rPr lang="en-US" smtClean="0"/>
-              <a:t>7/13/2021</a:t>
+              <a:t>7/19/2021</a:t>
             </a:fld>
             <a:endParaRPr lang="en-US"/>
           </a:p>
@@ -1825,7 +1831,7 @@
           <a:p>
             <a:fld id="{6524AA6A-33AF-41C8-84C7-4073CA180999}" type="datetimeFigureOut">
               <a:rPr lang="en-US" smtClean="0"/>
-              <a:t>7/13/2021</a:t>
+              <a:t>7/19/2021</a:t>
             </a:fld>
             <a:endParaRPr lang="en-US"/>
           </a:p>
@@ -1967,7 +1973,7 @@
           <a:p>
             <a:fld id="{6524AA6A-33AF-41C8-84C7-4073CA180999}" type="datetimeFigureOut">
               <a:rPr lang="en-US" smtClean="0"/>
-              <a:t>7/13/2021</a:t>
+              <a:t>7/19/2021</a:t>
             </a:fld>
             <a:endParaRPr lang="en-US"/>
           </a:p>
@@ -2080,7 +2086,7 @@
           <a:p>
             <a:fld id="{6524AA6A-33AF-41C8-84C7-4073CA180999}" type="datetimeFigureOut">
               <a:rPr lang="en-US" smtClean="0"/>
-              <a:t>7/13/2021</a:t>
+              <a:t>7/19/2021</a:t>
             </a:fld>
             <a:endParaRPr lang="en-US"/>
           </a:p>
@@ -2393,7 +2399,7 @@
           <a:p>
             <a:fld id="{6524AA6A-33AF-41C8-84C7-4073CA180999}" type="datetimeFigureOut">
               <a:rPr lang="en-US" smtClean="0"/>
-              <a:t>7/13/2021</a:t>
+              <a:t>7/19/2021</a:t>
             </a:fld>
             <a:endParaRPr lang="en-US"/>
           </a:p>
@@ -2682,7 +2688,7 @@
           <a:p>
             <a:fld id="{6524AA6A-33AF-41C8-84C7-4073CA180999}" type="datetimeFigureOut">
               <a:rPr lang="en-US" smtClean="0"/>
-              <a:t>7/13/2021</a:t>
+              <a:t>7/19/2021</a:t>
             </a:fld>
             <a:endParaRPr lang="en-US"/>
           </a:p>
@@ -2925,7 +2931,7 @@
           <a:p>
             <a:fld id="{6524AA6A-33AF-41C8-84C7-4073CA180999}" type="datetimeFigureOut">
               <a:rPr lang="en-US" smtClean="0"/>
-              <a:t>7/13/2021</a:t>
+              <a:t>7/19/2021</a:t>
             </a:fld>
             <a:endParaRPr lang="en-US"/>
           </a:p>
@@ -3512,6 +3518,72 @@
 </p:sld>
 </file>
 
+<file path=ppt/slides/slide2.xml><?xml version="1.0" encoding="utf-8"?>
+<p:sld xmlns:a="http://schemas.openxmlformats.org/drawingml/2006/main" xmlns:r="http://schemas.openxmlformats.org/officeDocument/2006/relationships" xmlns:p="http://schemas.openxmlformats.org/presentationml/2006/main">
+  <p:cSld>
+    <p:spTree>
+      <p:nvGrpSpPr>
+        <p:cNvPr id="1" name=""/>
+        <p:cNvGrpSpPr/>
+        <p:nvPr/>
+      </p:nvGrpSpPr>
+      <p:grpSpPr>
+        <a:xfrm>
+          <a:off x="0" y="0"/>
+          <a:ext cx="0" cy="0"/>
+          <a:chOff x="0" y="0"/>
+          <a:chExt cx="0" cy="0"/>
+        </a:xfrm>
+      </p:grpSpPr>
+      <p:pic>
+        <p:nvPicPr>
+          <p:cNvPr id="6" name="תמונה 5">
+            <a:extLst>
+              <a:ext uri="{FF2B5EF4-FFF2-40B4-BE49-F238E27FC236}">
+                <a16:creationId xmlns:a16="http://schemas.microsoft.com/office/drawing/2014/main" id="{D3C4E30A-AE06-4603-9870-EED019290411}"/>
+              </a:ext>
+            </a:extLst>
+          </p:cNvPr>
+          <p:cNvPicPr>
+            <a:picLocks noChangeAspect="1"/>
+          </p:cNvPicPr>
+          <p:nvPr/>
+        </p:nvPicPr>
+        <p:blipFill>
+          <a:blip r:embed="rId2">
+            <a:extLst>
+              <a:ext uri="{28A0092B-C50C-407E-A947-70E740481C1C}">
+                <a14:useLocalDpi xmlns:a14="http://schemas.microsoft.com/office/drawing/2010/main" val="0"/>
+              </a:ext>
+            </a:extLst>
+          </a:blip>
+          <a:stretch>
+            <a:fillRect/>
+          </a:stretch>
+        </p:blipFill>
+        <p:spPr>
+          <a:xfrm>
+            <a:off x="0" y="0"/>
+            <a:ext cx="12192000" cy="6857999"/>
+          </a:xfrm>
+          <a:prstGeom prst="rect">
+            <a:avLst/>
+          </a:prstGeom>
+        </p:spPr>
+      </p:pic>
+    </p:spTree>
+    <p:extLst>
+      <p:ext uri="{BB962C8B-B14F-4D97-AF65-F5344CB8AC3E}">
+        <p14:creationId xmlns:p14="http://schemas.microsoft.com/office/powerpoint/2010/main" val="1048812043"/>
+      </p:ext>
+    </p:extLst>
+  </p:cSld>
+  <p:clrMapOvr>
+    <a:masterClrMapping/>
+  </p:clrMapOvr>
+</p:sld>
+</file>
+
 <file path=ppt/theme/theme1.xml><?xml version="1.0" encoding="utf-8"?>
 <a:theme xmlns:a="http://schemas.openxmlformats.org/drawingml/2006/main" name="ערכת נושא Office">
   <a:themeElements>

</xml_diff>

<commit_message>
quest and game tweeks
</commit_message>
<xml_diff>
--- a/Assets/Etc/Textures.pptx
+++ b/Assets/Etc/Textures.pptx
@@ -263,7 +263,7 @@
           <a:p>
             <a:fld id="{6524AA6A-33AF-41C8-84C7-4073CA180999}" type="datetimeFigureOut">
               <a:rPr lang="en-US" smtClean="0"/>
-              <a:t>9/18/2021</a:t>
+              <a:t>9/20/2021</a:t>
             </a:fld>
             <a:endParaRPr lang="en-US"/>
           </a:p>
@@ -463,7 +463,7 @@
           <a:p>
             <a:fld id="{6524AA6A-33AF-41C8-84C7-4073CA180999}" type="datetimeFigureOut">
               <a:rPr lang="en-US" smtClean="0"/>
-              <a:t>9/18/2021</a:t>
+              <a:t>9/20/2021</a:t>
             </a:fld>
             <a:endParaRPr lang="en-US"/>
           </a:p>
@@ -673,7 +673,7 @@
           <a:p>
             <a:fld id="{6524AA6A-33AF-41C8-84C7-4073CA180999}" type="datetimeFigureOut">
               <a:rPr lang="en-US" smtClean="0"/>
-              <a:t>9/18/2021</a:t>
+              <a:t>9/20/2021</a:t>
             </a:fld>
             <a:endParaRPr lang="en-US"/>
           </a:p>
@@ -873,7 +873,7 @@
           <a:p>
             <a:fld id="{6524AA6A-33AF-41C8-84C7-4073CA180999}" type="datetimeFigureOut">
               <a:rPr lang="en-US" smtClean="0"/>
-              <a:t>9/18/2021</a:t>
+              <a:t>9/20/2021</a:t>
             </a:fld>
             <a:endParaRPr lang="en-US"/>
           </a:p>
@@ -1149,7 +1149,7 @@
           <a:p>
             <a:fld id="{6524AA6A-33AF-41C8-84C7-4073CA180999}" type="datetimeFigureOut">
               <a:rPr lang="en-US" smtClean="0"/>
-              <a:t>9/18/2021</a:t>
+              <a:t>9/20/2021</a:t>
             </a:fld>
             <a:endParaRPr lang="en-US"/>
           </a:p>
@@ -1417,7 +1417,7 @@
           <a:p>
             <a:fld id="{6524AA6A-33AF-41C8-84C7-4073CA180999}" type="datetimeFigureOut">
               <a:rPr lang="en-US" smtClean="0"/>
-              <a:t>9/18/2021</a:t>
+              <a:t>9/20/2021</a:t>
             </a:fld>
             <a:endParaRPr lang="en-US"/>
           </a:p>
@@ -1832,7 +1832,7 @@
           <a:p>
             <a:fld id="{6524AA6A-33AF-41C8-84C7-4073CA180999}" type="datetimeFigureOut">
               <a:rPr lang="en-US" smtClean="0"/>
-              <a:t>9/18/2021</a:t>
+              <a:t>9/20/2021</a:t>
             </a:fld>
             <a:endParaRPr lang="en-US"/>
           </a:p>
@@ -1974,7 +1974,7 @@
           <a:p>
             <a:fld id="{6524AA6A-33AF-41C8-84C7-4073CA180999}" type="datetimeFigureOut">
               <a:rPr lang="en-US" smtClean="0"/>
-              <a:t>9/18/2021</a:t>
+              <a:t>9/20/2021</a:t>
             </a:fld>
             <a:endParaRPr lang="en-US"/>
           </a:p>
@@ -2087,7 +2087,7 @@
           <a:p>
             <a:fld id="{6524AA6A-33AF-41C8-84C7-4073CA180999}" type="datetimeFigureOut">
               <a:rPr lang="en-US" smtClean="0"/>
-              <a:t>9/18/2021</a:t>
+              <a:t>9/20/2021</a:t>
             </a:fld>
             <a:endParaRPr lang="en-US"/>
           </a:p>
@@ -2400,7 +2400,7 @@
           <a:p>
             <a:fld id="{6524AA6A-33AF-41C8-84C7-4073CA180999}" type="datetimeFigureOut">
               <a:rPr lang="en-US" smtClean="0"/>
-              <a:t>9/18/2021</a:t>
+              <a:t>9/20/2021</a:t>
             </a:fld>
             <a:endParaRPr lang="en-US"/>
           </a:p>
@@ -2689,7 +2689,7 @@
           <a:p>
             <a:fld id="{6524AA6A-33AF-41C8-84C7-4073CA180999}" type="datetimeFigureOut">
               <a:rPr lang="en-US" smtClean="0"/>
-              <a:t>9/18/2021</a:t>
+              <a:t>9/20/2021</a:t>
             </a:fld>
             <a:endParaRPr lang="en-US"/>
           </a:p>
@@ -2932,7 +2932,7 @@
           <a:p>
             <a:fld id="{6524AA6A-33AF-41C8-84C7-4073CA180999}" type="datetimeFigureOut">
               <a:rPr lang="en-US" smtClean="0"/>
-              <a:t>9/18/2021</a:t>
+              <a:t>9/20/2021</a:t>
             </a:fld>
             <a:endParaRPr lang="en-US"/>
           </a:p>
@@ -4851,6 +4851,124 @@
           </p:txBody>
         </p:sp>
       </p:grpSp>
+      <p:grpSp>
+        <p:nvGrpSpPr>
+          <p:cNvPr id="34" name="קבוצה 33">
+            <a:extLst>
+              <a:ext uri="{FF2B5EF4-FFF2-40B4-BE49-F238E27FC236}">
+                <a16:creationId xmlns:a16="http://schemas.microsoft.com/office/drawing/2014/main" id="{10D7A1F7-9910-4700-A7EF-4367CDC04C93}"/>
+              </a:ext>
+            </a:extLst>
+          </p:cNvPr>
+          <p:cNvGrpSpPr/>
+          <p:nvPr/>
+        </p:nvGrpSpPr>
+        <p:grpSpPr>
+          <a:xfrm>
+            <a:off x="6087879" y="2505719"/>
+            <a:ext cx="1838948" cy="1761174"/>
+            <a:chOff x="962286" y="3941176"/>
+            <a:chExt cx="3144416" cy="1761174"/>
+          </a:xfrm>
+        </p:grpSpPr>
+        <p:pic>
+          <p:nvPicPr>
+            <p:cNvPr id="35" name="Picture 2" descr="Illustrations Of Control, Alt, Delete, And Two Shapes - Blank Keyboard Key  Transparent Background Transparent PNG - 1024x951 - Free Download on NicePNG">
+              <a:extLst>
+                <a:ext uri="{FF2B5EF4-FFF2-40B4-BE49-F238E27FC236}">
+                  <a16:creationId xmlns:a16="http://schemas.microsoft.com/office/drawing/2014/main" id="{686B238A-482D-4D0D-BC94-5672ED1894F6}"/>
+                </a:ext>
+              </a:extLst>
+            </p:cNvPr>
+            <p:cNvPicPr>
+              <a:picLocks noChangeAspect="1" noChangeArrowheads="1"/>
+            </p:cNvPicPr>
+            <p:nvPr/>
+          </p:nvPicPr>
+          <p:blipFill>
+            <a:blip r:embed="rId2">
+              <a:extLst>
+                <a:ext uri="{BEBA8EAE-BF5A-486C-A8C5-ECC9F3942E4B}">
+                  <a14:imgProps xmlns:a14="http://schemas.microsoft.com/office/drawing/2010/main">
+                    <a14:imgLayer r:embed="rId3">
+                      <a14:imgEffect>
+                        <a14:backgroundRemoval t="5368" b="89888" l="8049" r="90732">
+                          <a14:foregroundMark x1="85488" y1="17728" x2="85488" y2="17728"/>
+                          <a14:foregroundMark x1="79024" y1="7740" x2="79024" y2="7740"/>
+                          <a14:foregroundMark x1="80976" y1="74532" x2="80976" y2="74532"/>
+                        </a14:backgroundRemoval>
+                      </a14:imgEffect>
+                    </a14:imgLayer>
+                  </a14:imgProps>
+                </a:ext>
+                <a:ext uri="{28A0092B-C50C-407E-A947-70E740481C1C}">
+                  <a14:useLocalDpi xmlns:a14="http://schemas.microsoft.com/office/drawing/2010/main" val="0"/>
+                </a:ext>
+              </a:extLst>
+            </a:blip>
+            <a:srcRect/>
+            <a:stretch>
+              <a:fillRect/>
+            </a:stretch>
+          </p:blipFill>
+          <p:spPr bwMode="auto">
+            <a:xfrm>
+              <a:off x="962286" y="3941176"/>
+              <a:ext cx="3144416" cy="1761174"/>
+            </a:xfrm>
+            <a:prstGeom prst="rect">
+              <a:avLst/>
+            </a:prstGeom>
+            <a:noFill/>
+            <a:extLst>
+              <a:ext uri="{909E8E84-426E-40DD-AFC4-6F175D3DCCD1}">
+                <a14:hiddenFill xmlns:a14="http://schemas.microsoft.com/office/drawing/2010/main">
+                  <a:solidFill>
+                    <a:srgbClr val="FFFFFF"/>
+                  </a:solidFill>
+                </a14:hiddenFill>
+              </a:ext>
+            </a:extLst>
+          </p:spPr>
+        </p:pic>
+        <p:sp>
+          <p:nvSpPr>
+            <p:cNvPr id="36" name="תיבת טקסט 35">
+              <a:extLst>
+                <a:ext uri="{FF2B5EF4-FFF2-40B4-BE49-F238E27FC236}">
+                  <a16:creationId xmlns:a16="http://schemas.microsoft.com/office/drawing/2014/main" id="{03E262F6-B270-42F2-88C6-DA7933B4891B}"/>
+                </a:ext>
+              </a:extLst>
+            </p:cNvPr>
+            <p:cNvSpPr txBox="1"/>
+            <p:nvPr/>
+          </p:nvSpPr>
+          <p:spPr>
+            <a:xfrm>
+              <a:off x="1995917" y="4331929"/>
+              <a:ext cx="1077153" cy="769441"/>
+            </a:xfrm>
+            <a:prstGeom prst="rect">
+              <a:avLst/>
+            </a:prstGeom>
+            <a:noFill/>
+          </p:spPr>
+          <p:txBody>
+            <a:bodyPr wrap="square" rtlCol="0">
+              <a:spAutoFit/>
+            </a:bodyPr>
+            <a:lstStyle/>
+            <a:p>
+              <a:r>
+                <a:rPr lang="en-US" sz="4400" dirty="0">
+                  <a:latin typeface="Arial Black" panose="020B0A04020102020204" pitchFamily="34" charset="0"/>
+                </a:rPr>
+                <a:t>Z</a:t>
+              </a:r>
+            </a:p>
+          </p:txBody>
+        </p:sp>
+      </p:grpSp>
     </p:spTree>
     <p:extLst>
       <p:ext uri="{BB962C8B-B14F-4D97-AF65-F5344CB8AC3E}">

</xml_diff>